<commit_message>
Cleaner version with graveyard split out and more markdown in notebook
</commit_message>
<xml_diff>
--- a/Initial Analysis of Covid-19.pptx
+++ b/Initial Analysis of Covid-19.pptx
@@ -16796,8 +16796,8 @@
           </a:p>
         </p:txBody>
       </p:sp>
-      <mc:AlternateContent xmlns:mc="http://schemas.openxmlformats.org/markup-compatibility/2006">
-        <mc:Choice xmlns:a14="http://schemas.microsoft.com/office/drawing/2010/main" Requires="a14">
+      <mc:AlternateContent xmlns:mc="http://schemas.openxmlformats.org/markup-compatibility/2006" xmlns:a14="http://schemas.microsoft.com/office/drawing/2010/main">
+        <mc:Choice Requires="a14">
           <p:sp>
             <p:nvSpPr>
               <p:cNvPr id="3" name="Text Placeholder 2">
@@ -16938,13 +16938,7 @@
                           <a:rPr lang="en-US" i="1">
                             <a:latin typeface="Cambria Math" panose="02040503050406030204" pitchFamily="18" charset="0"/>
                           </a:rPr>
-                          <m:t>𝐶𝑎𝑠𝑒𝑅𝑎𝑡𝑒</m:t>
-                        </m:r>
-                        <m:r>
-                          <a:rPr lang="en-US" i="1">
-                            <a:latin typeface="Cambria Math" panose="02040503050406030204" pitchFamily="18" charset="0"/>
-                          </a:rPr>
-                          <m:t>𝐻𝑖</m:t>
+                          <m:t>𝐶𝑎𝑠𝑒𝑅𝑎𝑡𝑒𝐻𝑖</m:t>
                         </m:r>
                       </m:sub>
                     </m:sSub>
@@ -17003,7 +16997,7 @@
             </p:txBody>
           </p:sp>
         </mc:Choice>
-        <mc:Fallback>
+        <mc:Fallback xmlns="">
           <p:sp>
             <p:nvSpPr>
               <p:cNvPr id="3" name="Text Placeholder 2">
@@ -17982,8 +17976,8 @@
           </a:graphicData>
         </a:graphic>
       </p:graphicFrame>
-      <mc:AlternateContent xmlns:mc="http://schemas.openxmlformats.org/markup-compatibility/2006">
-        <mc:Choice xmlns:a14="http://schemas.microsoft.com/office/drawing/2010/main" Requires="a14">
+      <mc:AlternateContent xmlns:mc="http://schemas.openxmlformats.org/markup-compatibility/2006" xmlns:a14="http://schemas.microsoft.com/office/drawing/2010/main">
+        <mc:Choice Requires="a14">
           <p:sp>
             <p:nvSpPr>
               <p:cNvPr id="9" name="Google Shape;350;p24">
@@ -18340,7 +18334,7 @@
             </p:txBody>
           </p:sp>
         </mc:Choice>
-        <mc:Fallback>
+        <mc:Fallback xmlns="">
           <p:sp>
             <p:nvSpPr>
               <p:cNvPr id="9" name="Google Shape;350;p24">
@@ -19100,8 +19094,8 @@
           </a:p>
         </p:txBody>
       </p:sp>
-      <mc:AlternateContent xmlns:mc="http://schemas.openxmlformats.org/markup-compatibility/2006">
-        <mc:Choice xmlns:a14="http://schemas.microsoft.com/office/drawing/2010/main" Requires="a14">
+      <mc:AlternateContent xmlns:mc="http://schemas.openxmlformats.org/markup-compatibility/2006" xmlns:a14="http://schemas.microsoft.com/office/drawing/2010/main">
+        <mc:Choice Requires="a14">
           <p:sp>
             <p:nvSpPr>
               <p:cNvPr id="289" name="Google Shape;289;p15"/>
@@ -19378,7 +19372,7 @@
             </p:txBody>
           </p:sp>
         </mc:Choice>
-        <mc:Fallback>
+        <mc:Fallback xmlns="">
           <p:sp>
             <p:nvSpPr>
               <p:cNvPr id="289" name="Google Shape;289;p15"/>

</xml_diff>

<commit_message>
replaced wonky hists with boxplots
</commit_message>
<xml_diff>
--- a/Initial Analysis of Covid-19.pptx
+++ b/Initial Analysis of Covid-19.pptx
@@ -5,7 +5,7 @@
     <p:sldMasterId id="2147483659" r:id="rId1"/>
   </p:sldMasterIdLst>
   <p:notesMasterIdLst>
-    <p:notesMasterId r:id="rId19"/>
+    <p:notesMasterId r:id="rId22"/>
   </p:notesMasterIdLst>
   <p:sldIdLst>
     <p:sldId id="256" r:id="rId2"/>
@@ -20,30 +20,33 @@
     <p:sldId id="265" r:id="rId11"/>
     <p:sldId id="269" r:id="rId12"/>
     <p:sldId id="271" r:id="rId13"/>
-    <p:sldId id="272" r:id="rId14"/>
-    <p:sldId id="266" r:id="rId15"/>
-    <p:sldId id="267" r:id="rId16"/>
-    <p:sldId id="270" r:id="rId17"/>
-    <p:sldId id="268" r:id="rId18"/>
+    <p:sldId id="273" r:id="rId14"/>
+    <p:sldId id="274" r:id="rId15"/>
+    <p:sldId id="275" r:id="rId16"/>
+    <p:sldId id="272" r:id="rId17"/>
+    <p:sldId id="266" r:id="rId18"/>
+    <p:sldId id="267" r:id="rId19"/>
+    <p:sldId id="270" r:id="rId20"/>
+    <p:sldId id="268" r:id="rId21"/>
   </p:sldIdLst>
   <p:sldSz cx="9144000" cy="5143500" type="screen16x9"/>
   <p:notesSz cx="6858000" cy="9144000"/>
   <p:embeddedFontLst>
     <p:embeddedFont>
       <p:font typeface="Cambria Math" panose="02040503050406030204" pitchFamily="18" charset="0"/>
-      <p:regular r:id="rId20"/>
+      <p:regular r:id="rId23"/>
     </p:embeddedFont>
     <p:embeddedFont>
       <p:font typeface="Maven Pro" panose="020B0604020202020204" charset="0"/>
-      <p:regular r:id="rId21"/>
-      <p:bold r:id="rId22"/>
+      <p:regular r:id="rId24"/>
+      <p:bold r:id="rId25"/>
     </p:embeddedFont>
     <p:embeddedFont>
       <p:font typeface="Nunito" panose="020B0604020202020204" charset="0"/>
-      <p:regular r:id="rId23"/>
-      <p:bold r:id="rId24"/>
-      <p:italic r:id="rId25"/>
-      <p:boldItalic r:id="rId26"/>
+      <p:regular r:id="rId26"/>
+      <p:bold r:id="rId27"/>
+      <p:italic r:id="rId28"/>
+      <p:boldItalic r:id="rId29"/>
     </p:embeddedFont>
   </p:embeddedFontLst>
   <p:defaultTextStyle>
@@ -974,6 +977,78 @@
 </file>
 
 <file path=ppt/notesSlides/notesSlide11.xml><?xml version="1.0" encoding="utf-8"?>
+<p:notes xmlns:a="http://schemas.openxmlformats.org/drawingml/2006/main" xmlns:r="http://schemas.openxmlformats.org/officeDocument/2006/relationships" xmlns:p="http://schemas.openxmlformats.org/presentationml/2006/main">
+  <p:cSld>
+    <p:spTree>
+      <p:nvGrpSpPr>
+        <p:cNvPr id="1" name=""/>
+        <p:cNvGrpSpPr/>
+        <p:nvPr/>
+      </p:nvGrpSpPr>
+      <p:grpSpPr>
+        <a:xfrm>
+          <a:off x="0" y="0"/>
+          <a:ext cx="0" cy="0"/>
+          <a:chOff x="0" y="0"/>
+          <a:chExt cx="0" cy="0"/>
+        </a:xfrm>
+      </p:grpSpPr>
+      <p:sp>
+        <p:nvSpPr>
+          <p:cNvPr id="2" name="Slide Image Placeholder 1"/>
+          <p:cNvSpPr>
+            <a:spLocks noGrp="1" noRot="1" noChangeAspect="1"/>
+          </p:cNvSpPr>
+          <p:nvPr>
+            <p:ph type="sldImg"/>
+          </p:nvPr>
+        </p:nvSpPr>
+        <p:spPr>
+          <a:xfrm>
+            <a:off x="381000" y="685800"/>
+            <a:ext cx="6096000" cy="3429000"/>
+          </a:xfrm>
+        </p:spPr>
+      </p:sp>
+      <p:sp>
+        <p:nvSpPr>
+          <p:cNvPr id="3" name="Notes Placeholder 2"/>
+          <p:cNvSpPr>
+            <a:spLocks noGrp="1"/>
+          </p:cNvSpPr>
+          <p:nvPr>
+            <p:ph type="body" idx="1"/>
+          </p:nvPr>
+        </p:nvSpPr>
+        <p:spPr/>
+        <p:txBody>
+          <a:bodyPr/>
+          <a:lstStyle/>
+          <a:p>
+            <a:r>
+              <a:rPr lang="en-US" dirty="0"/>
+              <a:t>BOXPLOT/VIOLINPLOT</a:t>
+            </a:r>
+          </a:p>
+          <a:p>
+            <a:endParaRPr lang="en-US" dirty="0"/>
+          </a:p>
+        </p:txBody>
+      </p:sp>
+    </p:spTree>
+    <p:extLst>
+      <p:ext uri="{BB962C8B-B14F-4D97-AF65-F5344CB8AC3E}">
+        <p14:creationId xmlns:p14="http://schemas.microsoft.com/office/powerpoint/2010/main" val="1598287542"/>
+      </p:ext>
+    </p:extLst>
+  </p:cSld>
+  <p:clrMapOvr>
+    <a:masterClrMapping/>
+  </p:clrMapOvr>
+</p:notes>
+</file>
+
+<file path=ppt/notesSlides/notesSlide12.xml><?xml version="1.0" encoding="utf-8"?>
 <p:notes xmlns:a="http://schemas.openxmlformats.org/drawingml/2006/main" xmlns:r="http://schemas.openxmlformats.org/officeDocument/2006/relationships" xmlns:p="http://schemas.openxmlformats.org/presentationml/2006/main" showMasterSp="0" showMasterPhAnim="0">
   <p:cSld>
     <p:spTree>
@@ -1077,7 +1152,7 @@
 </p:notes>
 </file>
 
-<file path=ppt/notesSlides/notesSlide12.xml><?xml version="1.0" encoding="utf-8"?>
+<file path=ppt/notesSlides/notesSlide13.xml><?xml version="1.0" encoding="utf-8"?>
 <p:notes xmlns:a="http://schemas.openxmlformats.org/drawingml/2006/main" xmlns:r="http://schemas.openxmlformats.org/officeDocument/2006/relationships" xmlns:p="http://schemas.openxmlformats.org/presentationml/2006/main" showMasterSp="0" showMasterPhAnim="0">
   <p:cSld>
     <p:spTree>
@@ -1181,7 +1256,7 @@
 </p:notes>
 </file>
 
-<file path=ppt/notesSlides/notesSlide13.xml><?xml version="1.0" encoding="utf-8"?>
+<file path=ppt/notesSlides/notesSlide14.xml><?xml version="1.0" encoding="utf-8"?>
 <p:notes xmlns:a="http://schemas.openxmlformats.org/drawingml/2006/main" xmlns:r="http://schemas.openxmlformats.org/officeDocument/2006/relationships" xmlns:p="http://schemas.openxmlformats.org/presentationml/2006/main" showMasterSp="0" showMasterPhAnim="0">
   <p:cSld>
     <p:spTree>
@@ -1290,7 +1365,7 @@
 </p:notes>
 </file>
 
-<file path=ppt/notesSlides/notesSlide14.xml><?xml version="1.0" encoding="utf-8"?>
+<file path=ppt/notesSlides/notesSlide15.xml><?xml version="1.0" encoding="utf-8"?>
 <p:notes xmlns:a="http://schemas.openxmlformats.org/drawingml/2006/main" xmlns:r="http://schemas.openxmlformats.org/officeDocument/2006/relationships" xmlns:p="http://schemas.openxmlformats.org/presentationml/2006/main" showMasterSp="0" showMasterPhAnim="0">
   <p:cSld>
     <p:spTree>
@@ -17101,10 +17176,10 @@
       </p:sp>
       <p:pic>
         <p:nvPicPr>
-          <p:cNvPr id="1026" name="Picture 2">
+          <p:cNvPr id="1030" name="Picture 6">
             <a:extLst>
               <a:ext uri="{FF2B5EF4-FFF2-40B4-BE49-F238E27FC236}">
-                <a16:creationId xmlns:a16="http://schemas.microsoft.com/office/drawing/2014/main" id="{046BECDA-23A0-428B-87E9-7DD854F17B40}"/>
+                <a16:creationId xmlns:a16="http://schemas.microsoft.com/office/drawing/2014/main" id="{956295BC-888A-42E3-A8C3-997BFCA53CE3}"/>
               </a:ext>
             </a:extLst>
           </p:cNvPr>
@@ -17114,7 +17189,7 @@
           <p:nvPr/>
         </p:nvPicPr>
         <p:blipFill>
-          <a:blip r:embed="rId2">
+          <a:blip r:embed="rId3">
             <a:extLst>
               <a:ext uri="{28A0092B-C50C-407E-A947-70E740481C1C}">
                 <a14:useLocalDpi xmlns:a14="http://schemas.microsoft.com/office/drawing/2010/main" val="0"/>
@@ -17148,10 +17223,10 @@
       </p:pic>
       <p:pic>
         <p:nvPicPr>
-          <p:cNvPr id="1028" name="Picture 4">
+          <p:cNvPr id="1032" name="Picture 8">
             <a:extLst>
               <a:ext uri="{FF2B5EF4-FFF2-40B4-BE49-F238E27FC236}">
-                <a16:creationId xmlns:a16="http://schemas.microsoft.com/office/drawing/2014/main" id="{2B7E49FF-9C99-49C3-A59B-8341AF679C81}"/>
+                <a16:creationId xmlns:a16="http://schemas.microsoft.com/office/drawing/2014/main" id="{886A7656-BD49-4176-8090-C0DED75954B8}"/>
               </a:ext>
             </a:extLst>
           </p:cNvPr>
@@ -17161,7 +17236,7 @@
           <p:nvPr/>
         </p:nvPicPr>
         <p:blipFill>
-          <a:blip r:embed="rId3">
+          <a:blip r:embed="rId4">
             <a:extLst>
               <a:ext uri="{28A0092B-C50C-407E-A947-70E740481C1C}">
                 <a14:useLocalDpi xmlns:a14="http://schemas.microsoft.com/office/drawing/2010/main" val="0"/>
@@ -17175,8 +17250,8 @@
         </p:blipFill>
         <p:spPr bwMode="auto">
           <a:xfrm>
-            <a:off x="4575528" y="1943100"/>
-            <a:ext cx="4568472" cy="3200400"/>
+            <a:off x="4575526" y="1943098"/>
+            <a:ext cx="4568473" cy="3200401"/>
           </a:xfrm>
           <a:prstGeom prst="rect">
             <a:avLst/>
@@ -17207,6 +17282,415 @@
 </file>
 
 <file path=ppt/slides/slide13.xml><?xml version="1.0" encoding="utf-8"?>
+<p:sld xmlns:a="http://schemas.openxmlformats.org/drawingml/2006/main" xmlns:r="http://schemas.openxmlformats.org/officeDocument/2006/relationships" xmlns:p="http://schemas.openxmlformats.org/presentationml/2006/main">
+  <p:cSld>
+    <p:spTree>
+      <p:nvGrpSpPr>
+        <p:cNvPr id="1" name=""/>
+        <p:cNvGrpSpPr/>
+        <p:nvPr/>
+      </p:nvGrpSpPr>
+      <p:grpSpPr>
+        <a:xfrm>
+          <a:off x="0" y="0"/>
+          <a:ext cx="0" cy="0"/>
+          <a:chOff x="0" y="0"/>
+          <a:chExt cx="0" cy="0"/>
+        </a:xfrm>
+      </p:grpSpPr>
+      <p:sp>
+        <p:nvSpPr>
+          <p:cNvPr id="2" name="Title 1">
+            <a:extLst>
+              <a:ext uri="{FF2B5EF4-FFF2-40B4-BE49-F238E27FC236}">
+                <a16:creationId xmlns:a16="http://schemas.microsoft.com/office/drawing/2014/main" id="{B75D1655-B091-4F5A-B166-AE80FAB78AC7}"/>
+              </a:ext>
+            </a:extLst>
+          </p:cNvPr>
+          <p:cNvSpPr>
+            <a:spLocks noGrp="1"/>
+          </p:cNvSpPr>
+          <p:nvPr>
+            <p:ph type="title"/>
+          </p:nvPr>
+        </p:nvSpPr>
+        <p:spPr/>
+        <p:txBody>
+          <a:bodyPr/>
+          <a:lstStyle/>
+          <a:p>
+            <a:r>
+              <a:rPr lang="en-US" dirty="0"/>
+              <a:t>Visual check</a:t>
+            </a:r>
+          </a:p>
+        </p:txBody>
+      </p:sp>
+      <p:pic>
+        <p:nvPicPr>
+          <p:cNvPr id="2050" name="Picture 2">
+            <a:extLst>
+              <a:ext uri="{FF2B5EF4-FFF2-40B4-BE49-F238E27FC236}">
+                <a16:creationId xmlns:a16="http://schemas.microsoft.com/office/drawing/2014/main" id="{5C462164-46BA-4F56-A70B-82F1A63D668D}"/>
+              </a:ext>
+            </a:extLst>
+          </p:cNvPr>
+          <p:cNvPicPr>
+            <a:picLocks noChangeAspect="1" noChangeArrowheads="1"/>
+          </p:cNvPicPr>
+          <p:nvPr/>
+        </p:nvPicPr>
+        <p:blipFill>
+          <a:blip r:embed="rId2">
+            <a:extLst>
+              <a:ext uri="{28A0092B-C50C-407E-A947-70E740481C1C}">
+                <a14:useLocalDpi xmlns:a14="http://schemas.microsoft.com/office/drawing/2010/main" val="0"/>
+              </a:ext>
+            </a:extLst>
+          </a:blip>
+          <a:srcRect/>
+          <a:stretch>
+            <a:fillRect/>
+          </a:stretch>
+        </p:blipFill>
+        <p:spPr bwMode="auto">
+          <a:xfrm>
+            <a:off x="1" y="1940628"/>
+            <a:ext cx="4572000" cy="3202872"/>
+          </a:xfrm>
+          <a:prstGeom prst="rect">
+            <a:avLst/>
+          </a:prstGeom>
+          <a:noFill/>
+          <a:extLst>
+            <a:ext uri="{909E8E84-426E-40DD-AFC4-6F175D3DCCD1}">
+              <a14:hiddenFill xmlns:a14="http://schemas.microsoft.com/office/drawing/2010/main">
+                <a:solidFill>
+                  <a:srgbClr val="FFFFFF"/>
+                </a:solidFill>
+              </a14:hiddenFill>
+            </a:ext>
+          </a:extLst>
+        </p:spPr>
+      </p:pic>
+      <p:pic>
+        <p:nvPicPr>
+          <p:cNvPr id="2052" name="Picture 4">
+            <a:extLst>
+              <a:ext uri="{FF2B5EF4-FFF2-40B4-BE49-F238E27FC236}">
+                <a16:creationId xmlns:a16="http://schemas.microsoft.com/office/drawing/2014/main" id="{BCBA0EFB-DB8F-4C63-9E0C-017C2377017D}"/>
+              </a:ext>
+            </a:extLst>
+          </p:cNvPr>
+          <p:cNvPicPr>
+            <a:picLocks noChangeAspect="1" noChangeArrowheads="1"/>
+          </p:cNvPicPr>
+          <p:nvPr/>
+        </p:nvPicPr>
+        <p:blipFill>
+          <a:blip r:embed="rId3">
+            <a:extLst>
+              <a:ext uri="{28A0092B-C50C-407E-A947-70E740481C1C}">
+                <a14:useLocalDpi xmlns:a14="http://schemas.microsoft.com/office/drawing/2010/main" val="0"/>
+              </a:ext>
+            </a:extLst>
+          </a:blip>
+          <a:srcRect/>
+          <a:stretch>
+            <a:fillRect/>
+          </a:stretch>
+        </p:blipFill>
+        <p:spPr bwMode="auto">
+          <a:xfrm>
+            <a:off x="4571999" y="1940628"/>
+            <a:ext cx="4572000" cy="3202872"/>
+          </a:xfrm>
+          <a:prstGeom prst="rect">
+            <a:avLst/>
+          </a:prstGeom>
+          <a:noFill/>
+          <a:extLst>
+            <a:ext uri="{909E8E84-426E-40DD-AFC4-6F175D3DCCD1}">
+              <a14:hiddenFill xmlns:a14="http://schemas.microsoft.com/office/drawing/2010/main">
+                <a:solidFill>
+                  <a:srgbClr val="FFFFFF"/>
+                </a:solidFill>
+              </a14:hiddenFill>
+            </a:ext>
+          </a:extLst>
+        </p:spPr>
+      </p:pic>
+    </p:spTree>
+    <p:extLst>
+      <p:ext uri="{BB962C8B-B14F-4D97-AF65-F5344CB8AC3E}">
+        <p14:creationId xmlns:p14="http://schemas.microsoft.com/office/powerpoint/2010/main" val="2472677427"/>
+      </p:ext>
+    </p:extLst>
+  </p:cSld>
+  <p:clrMapOvr>
+    <a:masterClrMapping/>
+  </p:clrMapOvr>
+</p:sld>
+</file>
+
+<file path=ppt/slides/slide14.xml><?xml version="1.0" encoding="utf-8"?>
+<p:sld xmlns:a="http://schemas.openxmlformats.org/drawingml/2006/main" xmlns:r="http://schemas.openxmlformats.org/officeDocument/2006/relationships" xmlns:p="http://schemas.openxmlformats.org/presentationml/2006/main">
+  <p:cSld>
+    <p:spTree>
+      <p:nvGrpSpPr>
+        <p:cNvPr id="1" name=""/>
+        <p:cNvGrpSpPr/>
+        <p:nvPr/>
+      </p:nvGrpSpPr>
+      <p:grpSpPr>
+        <a:xfrm>
+          <a:off x="0" y="0"/>
+          <a:ext cx="0" cy="0"/>
+          <a:chOff x="0" y="0"/>
+          <a:chExt cx="0" cy="0"/>
+        </a:xfrm>
+      </p:grpSpPr>
+      <p:sp>
+        <p:nvSpPr>
+          <p:cNvPr id="2" name="Title 1">
+            <a:extLst>
+              <a:ext uri="{FF2B5EF4-FFF2-40B4-BE49-F238E27FC236}">
+                <a16:creationId xmlns:a16="http://schemas.microsoft.com/office/drawing/2014/main" id="{BA762C70-629D-41CF-BF87-829EFDB51A90}"/>
+              </a:ext>
+            </a:extLst>
+          </p:cNvPr>
+          <p:cNvSpPr>
+            <a:spLocks noGrp="1"/>
+          </p:cNvSpPr>
+          <p:nvPr>
+            <p:ph type="title"/>
+          </p:nvPr>
+        </p:nvSpPr>
+        <p:spPr/>
+        <p:txBody>
+          <a:bodyPr/>
+          <a:lstStyle/>
+          <a:p>
+            <a:r>
+              <a:rPr lang="en-US" dirty="0"/>
+              <a:t>Visual check</a:t>
+            </a:r>
+          </a:p>
+        </p:txBody>
+      </p:sp>
+      <p:pic>
+        <p:nvPicPr>
+          <p:cNvPr id="3074" name="Picture 2">
+            <a:extLst>
+              <a:ext uri="{FF2B5EF4-FFF2-40B4-BE49-F238E27FC236}">
+                <a16:creationId xmlns:a16="http://schemas.microsoft.com/office/drawing/2014/main" id="{207C6382-59E9-4E42-B23B-C488EBCF4AAE}"/>
+              </a:ext>
+            </a:extLst>
+          </p:cNvPr>
+          <p:cNvPicPr>
+            <a:picLocks noChangeAspect="1" noChangeArrowheads="1"/>
+          </p:cNvPicPr>
+          <p:nvPr/>
+        </p:nvPicPr>
+        <p:blipFill>
+          <a:blip r:embed="rId2">
+            <a:extLst>
+              <a:ext uri="{28A0092B-C50C-407E-A947-70E740481C1C}">
+                <a14:useLocalDpi xmlns:a14="http://schemas.microsoft.com/office/drawing/2010/main" val="0"/>
+              </a:ext>
+            </a:extLst>
+          </a:blip>
+          <a:srcRect/>
+          <a:stretch>
+            <a:fillRect/>
+          </a:stretch>
+        </p:blipFill>
+        <p:spPr bwMode="auto">
+          <a:xfrm>
+            <a:off x="1" y="1940628"/>
+            <a:ext cx="4572000" cy="3202872"/>
+          </a:xfrm>
+          <a:prstGeom prst="rect">
+            <a:avLst/>
+          </a:prstGeom>
+          <a:noFill/>
+          <a:extLst>
+            <a:ext uri="{909E8E84-426E-40DD-AFC4-6F175D3DCCD1}">
+              <a14:hiddenFill xmlns:a14="http://schemas.microsoft.com/office/drawing/2010/main">
+                <a:solidFill>
+                  <a:srgbClr val="FFFFFF"/>
+                </a:solidFill>
+              </a14:hiddenFill>
+            </a:ext>
+          </a:extLst>
+        </p:spPr>
+      </p:pic>
+      <p:pic>
+        <p:nvPicPr>
+          <p:cNvPr id="3076" name="Picture 4">
+            <a:extLst>
+              <a:ext uri="{FF2B5EF4-FFF2-40B4-BE49-F238E27FC236}">
+                <a16:creationId xmlns:a16="http://schemas.microsoft.com/office/drawing/2014/main" id="{D77EEA07-35B9-45AB-9D9A-2E8EB776782F}"/>
+              </a:ext>
+            </a:extLst>
+          </p:cNvPr>
+          <p:cNvPicPr>
+            <a:picLocks noChangeAspect="1" noChangeArrowheads="1"/>
+          </p:cNvPicPr>
+          <p:nvPr/>
+        </p:nvPicPr>
+        <p:blipFill>
+          <a:blip r:embed="rId3">
+            <a:extLst>
+              <a:ext uri="{28A0092B-C50C-407E-A947-70E740481C1C}">
+                <a14:useLocalDpi xmlns:a14="http://schemas.microsoft.com/office/drawing/2010/main" val="0"/>
+              </a:ext>
+            </a:extLst>
+          </a:blip>
+          <a:srcRect/>
+          <a:stretch>
+            <a:fillRect/>
+          </a:stretch>
+        </p:blipFill>
+        <p:spPr bwMode="auto">
+          <a:xfrm>
+            <a:off x="4571997" y="1940626"/>
+            <a:ext cx="4572002" cy="3202873"/>
+          </a:xfrm>
+          <a:prstGeom prst="rect">
+            <a:avLst/>
+          </a:prstGeom>
+          <a:noFill/>
+          <a:extLst>
+            <a:ext uri="{909E8E84-426E-40DD-AFC4-6F175D3DCCD1}">
+              <a14:hiddenFill xmlns:a14="http://schemas.microsoft.com/office/drawing/2010/main">
+                <a:solidFill>
+                  <a:srgbClr val="FFFFFF"/>
+                </a:solidFill>
+              </a14:hiddenFill>
+            </a:ext>
+          </a:extLst>
+        </p:spPr>
+      </p:pic>
+    </p:spTree>
+    <p:extLst>
+      <p:ext uri="{BB962C8B-B14F-4D97-AF65-F5344CB8AC3E}">
+        <p14:creationId xmlns:p14="http://schemas.microsoft.com/office/powerpoint/2010/main" val="129973417"/>
+      </p:ext>
+    </p:extLst>
+  </p:cSld>
+  <p:clrMapOvr>
+    <a:masterClrMapping/>
+  </p:clrMapOvr>
+</p:sld>
+</file>
+
+<file path=ppt/slides/slide15.xml><?xml version="1.0" encoding="utf-8"?>
+<p:sld xmlns:a="http://schemas.openxmlformats.org/drawingml/2006/main" xmlns:r="http://schemas.openxmlformats.org/officeDocument/2006/relationships" xmlns:p="http://schemas.openxmlformats.org/presentationml/2006/main">
+  <p:cSld>
+    <p:spTree>
+      <p:nvGrpSpPr>
+        <p:cNvPr id="1" name=""/>
+        <p:cNvGrpSpPr/>
+        <p:nvPr/>
+      </p:nvGrpSpPr>
+      <p:grpSpPr>
+        <a:xfrm>
+          <a:off x="0" y="0"/>
+          <a:ext cx="0" cy="0"/>
+          <a:chOff x="0" y="0"/>
+          <a:chExt cx="0" cy="0"/>
+        </a:xfrm>
+      </p:grpSpPr>
+      <p:sp>
+        <p:nvSpPr>
+          <p:cNvPr id="2" name="Title 1">
+            <a:extLst>
+              <a:ext uri="{FF2B5EF4-FFF2-40B4-BE49-F238E27FC236}">
+                <a16:creationId xmlns:a16="http://schemas.microsoft.com/office/drawing/2014/main" id="{66D84D58-57C8-4F44-86BA-1CCD748D570C}"/>
+              </a:ext>
+            </a:extLst>
+          </p:cNvPr>
+          <p:cNvSpPr>
+            <a:spLocks noGrp="1"/>
+          </p:cNvSpPr>
+          <p:nvPr>
+            <p:ph type="title"/>
+          </p:nvPr>
+        </p:nvSpPr>
+        <p:spPr/>
+        <p:txBody>
+          <a:bodyPr/>
+          <a:lstStyle/>
+          <a:p>
+            <a:r>
+              <a:rPr lang="en-US" dirty="0"/>
+              <a:t>Visual check</a:t>
+            </a:r>
+          </a:p>
+        </p:txBody>
+      </p:sp>
+      <p:pic>
+        <p:nvPicPr>
+          <p:cNvPr id="4098" name="Picture 2">
+            <a:extLst>
+              <a:ext uri="{FF2B5EF4-FFF2-40B4-BE49-F238E27FC236}">
+                <a16:creationId xmlns:a16="http://schemas.microsoft.com/office/drawing/2014/main" id="{9B6677CE-28E7-4720-A31D-78482DCEB062}"/>
+              </a:ext>
+            </a:extLst>
+          </p:cNvPr>
+          <p:cNvPicPr>
+            <a:picLocks noChangeAspect="1" noChangeArrowheads="1"/>
+          </p:cNvPicPr>
+          <p:nvPr/>
+        </p:nvPicPr>
+        <p:blipFill>
+          <a:blip r:embed="rId2">
+            <a:extLst>
+              <a:ext uri="{28A0092B-C50C-407E-A947-70E740481C1C}">
+                <a14:useLocalDpi xmlns:a14="http://schemas.microsoft.com/office/drawing/2010/main" val="0"/>
+              </a:ext>
+            </a:extLst>
+          </a:blip>
+          <a:srcRect/>
+          <a:stretch>
+            <a:fillRect/>
+          </a:stretch>
+        </p:blipFill>
+        <p:spPr bwMode="auto">
+          <a:xfrm>
+            <a:off x="2216857" y="1843750"/>
+            <a:ext cx="4710286" cy="3299750"/>
+          </a:xfrm>
+          <a:prstGeom prst="rect">
+            <a:avLst/>
+          </a:prstGeom>
+          <a:noFill/>
+          <a:extLst>
+            <a:ext uri="{909E8E84-426E-40DD-AFC4-6F175D3DCCD1}">
+              <a14:hiddenFill xmlns:a14="http://schemas.microsoft.com/office/drawing/2010/main">
+                <a:solidFill>
+                  <a:srgbClr val="FFFFFF"/>
+                </a:solidFill>
+              </a14:hiddenFill>
+            </a:ext>
+          </a:extLst>
+        </p:spPr>
+      </p:pic>
+    </p:spTree>
+    <p:extLst>
+      <p:ext uri="{BB962C8B-B14F-4D97-AF65-F5344CB8AC3E}">
+        <p14:creationId xmlns:p14="http://schemas.microsoft.com/office/powerpoint/2010/main" val="2831456225"/>
+      </p:ext>
+    </p:extLst>
+  </p:cSld>
+  <p:clrMapOvr>
+    <a:masterClrMapping/>
+  </p:clrMapOvr>
+</p:sld>
+</file>
+
+<file path=ppt/slides/slide16.xml><?xml version="1.0" encoding="utf-8"?>
 <p:sld xmlns:a="http://schemas.openxmlformats.org/drawingml/2006/main" xmlns:r="http://schemas.openxmlformats.org/officeDocument/2006/relationships" xmlns:p="http://schemas.openxmlformats.org/presentationml/2006/main">
   <p:cSld>
     <p:spTree>
@@ -18394,7 +18878,7 @@
 </p:sld>
 </file>
 
-<file path=ppt/slides/slide14.xml><?xml version="1.0" encoding="utf-8"?>
+<file path=ppt/slides/slide17.xml><?xml version="1.0" encoding="utf-8"?>
 <p:sld xmlns:a="http://schemas.openxmlformats.org/drawingml/2006/main" xmlns:r="http://schemas.openxmlformats.org/officeDocument/2006/relationships" xmlns:p="http://schemas.openxmlformats.org/presentationml/2006/main">
   <p:cSld>
     <p:spTree>
@@ -18461,7 +18945,7 @@
 </p:sld>
 </file>
 
-<file path=ppt/slides/slide15.xml><?xml version="1.0" encoding="utf-8"?>
+<file path=ppt/slides/slide18.xml><?xml version="1.0" encoding="utf-8"?>
 <p:sld xmlns:a="http://schemas.openxmlformats.org/drawingml/2006/main" xmlns:r="http://schemas.openxmlformats.org/officeDocument/2006/relationships" xmlns:p="http://schemas.openxmlformats.org/presentationml/2006/main">
   <p:cSld>
     <p:spTree>
@@ -18643,7 +19127,7 @@
 </p:sld>
 </file>
 
-<file path=ppt/slides/slide16.xml><?xml version="1.0" encoding="utf-8"?>
+<file path=ppt/slides/slide19.xml><?xml version="1.0" encoding="utf-8"?>
 <p:sld xmlns:a="http://schemas.openxmlformats.org/drawingml/2006/main" xmlns:r="http://schemas.openxmlformats.org/officeDocument/2006/relationships" xmlns:p="http://schemas.openxmlformats.org/presentationml/2006/main">
   <p:cSld>
     <p:spTree>
@@ -18894,73 +19378,6 @@
         <p14:creationId xmlns:p14="http://schemas.microsoft.com/office/powerpoint/2010/main" val="2033315209"/>
       </p:ext>
     </p:extLst>
-  </p:cSld>
-  <p:clrMapOvr>
-    <a:masterClrMapping/>
-  </p:clrMapOvr>
-</p:sld>
-</file>
-
-<file path=ppt/slides/slide17.xml><?xml version="1.0" encoding="utf-8"?>
-<p:sld xmlns:a="http://schemas.openxmlformats.org/drawingml/2006/main" xmlns:r="http://schemas.openxmlformats.org/officeDocument/2006/relationships" xmlns:p="http://schemas.openxmlformats.org/presentationml/2006/main">
-  <p:cSld>
-    <p:spTree>
-      <p:nvGrpSpPr>
-        <p:cNvPr id="1" name="Shape 354"/>
-        <p:cNvGrpSpPr/>
-        <p:nvPr/>
-      </p:nvGrpSpPr>
-      <p:grpSpPr>
-        <a:xfrm>
-          <a:off x="0" y="0"/>
-          <a:ext cx="0" cy="0"/>
-          <a:chOff x="0" y="0"/>
-          <a:chExt cx="0" cy="0"/>
-        </a:xfrm>
-      </p:grpSpPr>
-      <p:sp>
-        <p:nvSpPr>
-          <p:cNvPr id="355" name="Google Shape;355;p25"/>
-          <p:cNvSpPr txBox="1">
-            <a:spLocks noGrp="1"/>
-          </p:cNvSpPr>
-          <p:nvPr>
-            <p:ph type="title"/>
-          </p:nvPr>
-        </p:nvSpPr>
-        <p:spPr>
-          <a:xfrm>
-            <a:off x="824000" y="1613825"/>
-            <a:ext cx="5857800" cy="1872900"/>
-          </a:xfrm>
-          <a:prstGeom prst="rect">
-            <a:avLst/>
-          </a:prstGeom>
-        </p:spPr>
-        <p:txBody>
-          <a:bodyPr spcFirstLastPara="1" wrap="square" lIns="91425" tIns="91425" rIns="91425" bIns="91425" anchor="ctr" anchorCtr="0">
-            <a:noAutofit/>
-          </a:bodyPr>
-          <a:lstStyle/>
-          <a:p>
-            <a:pPr marL="0" lvl="0" indent="0" algn="l" rtl="0">
-              <a:spcBef>
-                <a:spcPts val="0"/>
-              </a:spcBef>
-              <a:spcAft>
-                <a:spcPts val="0"/>
-              </a:spcAft>
-              <a:buNone/>
-            </a:pPr>
-            <a:r>
-              <a:rPr lang="en"/>
-              <a:t>Questions?</a:t>
-            </a:r>
-            <a:endParaRPr/>
-          </a:p>
-        </p:txBody>
-      </p:sp>
-    </p:spTree>
   </p:cSld>
   <p:clrMapOvr>
     <a:masterClrMapping/>
@@ -19022,6 +19439,73 @@
             <a:r>
               <a:rPr lang="en"/>
               <a:t>Preliminary Setup</a:t>
+            </a:r>
+            <a:endParaRPr/>
+          </a:p>
+        </p:txBody>
+      </p:sp>
+    </p:spTree>
+  </p:cSld>
+  <p:clrMapOvr>
+    <a:masterClrMapping/>
+  </p:clrMapOvr>
+</p:sld>
+</file>
+
+<file path=ppt/slides/slide20.xml><?xml version="1.0" encoding="utf-8"?>
+<p:sld xmlns:a="http://schemas.openxmlformats.org/drawingml/2006/main" xmlns:r="http://schemas.openxmlformats.org/officeDocument/2006/relationships" xmlns:p="http://schemas.openxmlformats.org/presentationml/2006/main">
+  <p:cSld>
+    <p:spTree>
+      <p:nvGrpSpPr>
+        <p:cNvPr id="1" name="Shape 354"/>
+        <p:cNvGrpSpPr/>
+        <p:nvPr/>
+      </p:nvGrpSpPr>
+      <p:grpSpPr>
+        <a:xfrm>
+          <a:off x="0" y="0"/>
+          <a:ext cx="0" cy="0"/>
+          <a:chOff x="0" y="0"/>
+          <a:chExt cx="0" cy="0"/>
+        </a:xfrm>
+      </p:grpSpPr>
+      <p:sp>
+        <p:nvSpPr>
+          <p:cNvPr id="355" name="Google Shape;355;p25"/>
+          <p:cNvSpPr txBox="1">
+            <a:spLocks noGrp="1"/>
+          </p:cNvSpPr>
+          <p:nvPr>
+            <p:ph type="title"/>
+          </p:nvPr>
+        </p:nvSpPr>
+        <p:spPr>
+          <a:xfrm>
+            <a:off x="824000" y="1613825"/>
+            <a:ext cx="5857800" cy="1872900"/>
+          </a:xfrm>
+          <a:prstGeom prst="rect">
+            <a:avLst/>
+          </a:prstGeom>
+        </p:spPr>
+        <p:txBody>
+          <a:bodyPr spcFirstLastPara="1" wrap="square" lIns="91425" tIns="91425" rIns="91425" bIns="91425" anchor="ctr" anchorCtr="0">
+            <a:noAutofit/>
+          </a:bodyPr>
+          <a:lstStyle/>
+          <a:p>
+            <a:pPr marL="0" lvl="0" indent="0" algn="l" rtl="0">
+              <a:spcBef>
+                <a:spcPts val="0"/>
+              </a:spcBef>
+              <a:spcAft>
+                <a:spcPts val="0"/>
+              </a:spcAft>
+              <a:buNone/>
+            </a:pPr>
+            <a:r>
+              <a:rPr lang="en"/>
+              <a:t>Questions?</a:t>
             </a:r>
             <a:endParaRPr/>
           </a:p>

</xml_diff>